<commit_message>
Changed Presentation and added questionnaire
</commit_message>
<xml_diff>
--- a/Group 13 Powerpoint presentation2.pptx
+++ b/Group 13 Powerpoint presentation2.pptx
@@ -3098,56 +3098,39 @@
           <a:p>
             <a:r>
               <a:rPr lang="en-GB" sz="1400" dirty="0"/>
-              <a:t>M</a:t>
-            </a:r>
-            <a:r>
-              <a:rPr lang="en-GB" sz="1400" dirty="0" smtClean="0"/>
-              <a:t>odule Group Project IMDCGD111-16YRD</a:t>
+              <a:t>Module Group Project IMDCGD111-16YRD</a:t>
             </a:r>
             <a:br>
-              <a:rPr lang="en-GB" sz="1400" dirty="0" smtClean="0"/>
+              <a:rPr lang="en-GB" sz="1400" dirty="0"/>
             </a:br>
             <a:r>
-              <a:rPr lang="en-GB" sz="1400" dirty="0" smtClean="0"/>
+              <a:rPr lang="en-GB" sz="1400" dirty="0"/>
               <a:t>Module managing games production imdcgd214-16yrd</a:t>
             </a:r>
-            <a:r>
-              <a:rPr lang="en-GB" sz="6600" dirty="0" smtClean="0"/>
-              <a:t/>
-            </a:r>
             <a:br>
-              <a:rPr lang="en-GB" sz="6600" dirty="0" smtClean="0"/>
+              <a:rPr lang="en-GB" sz="6600" dirty="0"/>
             </a:br>
-            <a:r>
-              <a:rPr lang="en-GB" sz="6600" dirty="0" smtClean="0"/>
-              <a:t/>
-            </a:r>
             <a:br>
-              <a:rPr lang="en-GB" sz="6600" dirty="0" smtClean="0"/>
+              <a:rPr lang="en-GB" sz="6600" dirty="0"/>
             </a:br>
             <a:r>
-              <a:rPr lang="en-GB" sz="2200" dirty="0" smtClean="0"/>
+              <a:rPr lang="en-GB" sz="2200" dirty="0"/>
               <a:t>level 4/5 </a:t>
             </a:r>
             <a:r>
-              <a:rPr lang="en-GB" sz="2400" dirty="0" smtClean="0"/>
+              <a:rPr lang="en-GB" sz="2400" dirty="0"/>
               <a:t>Group 13</a:t>
             </a:r>
             <a:br>
-              <a:rPr lang="en-GB" sz="2400" dirty="0" smtClean="0"/>
+              <a:rPr lang="en-GB" sz="2400" dirty="0"/>
             </a:br>
-            <a:r>
-              <a:rPr lang="en-GB" sz="2400" dirty="0" smtClean="0"/>
-              <a:t/>
-            </a:r>
             <a:br>
-              <a:rPr lang="en-GB" sz="2400" dirty="0" smtClean="0"/>
+              <a:rPr lang="en-GB" sz="2400" dirty="0"/>
             </a:br>
             <a:r>
-              <a:rPr lang="en-GB" sz="6000" dirty="0" smtClean="0"/>
+              <a:rPr lang="en-GB" sz="6000" dirty="0"/>
               <a:t>Eat them</a:t>
             </a:r>
-            <a:endParaRPr lang="en-GB" sz="6000" dirty="0"/>
           </a:p>
         </p:txBody>
       </p:sp>
@@ -3199,13 +3182,6 @@
   <p:clrMapOvr>
     <a:masterClrMapping/>
   </p:clrMapOvr>
-  <p:timing>
-    <p:tnLst>
-      <p:par>
-        <p:cTn id="1" dur="indefinite" restart="never" nodeType="tmRoot"/>
-      </p:par>
-    </p:tnLst>
-  </p:timing>
 </p:sld>
 </file>
 
@@ -3244,14 +3220,14 @@
           <a:lstStyle/>
           <a:p>
             <a:r>
-              <a:rPr lang="en-GB" dirty="0" smtClean="0"/>
+              <a:rPr lang="en-GB" dirty="0"/>
               <a:t>Prototype</a:t>
             </a:r>
             <a:br>
-              <a:rPr lang="en-GB" dirty="0" smtClean="0"/>
+              <a:rPr lang="en-GB" dirty="0"/>
             </a:br>
             <a:r>
-              <a:rPr lang="en-GB" dirty="0" smtClean="0"/>
+              <a:rPr lang="en-GB" dirty="0"/>
               <a:t>Screen 1</a:t>
             </a:r>
             <a:endParaRPr lang="en-US" dirty="0"/>
@@ -3307,13 +3283,6 @@
   <p:clrMapOvr>
     <a:masterClrMapping/>
   </p:clrMapOvr>
-  <p:timing>
-    <p:tnLst>
-      <p:par>
-        <p:cTn id="1" dur="indefinite" restart="never" nodeType="tmRoot"/>
-      </p:par>
-    </p:tnLst>
-  </p:timing>
 </p:sld>
 </file>
 
@@ -3352,7 +3321,7 @@
           <a:lstStyle/>
           <a:p>
             <a:r>
-              <a:rPr lang="en-GB" sz="5400" dirty="0" smtClean="0"/>
+              <a:rPr lang="en-GB" sz="5400" dirty="0"/>
               <a:t>Prototype</a:t>
             </a:r>
             <a:endParaRPr lang="en-US" sz="5400" dirty="0"/>
@@ -3398,13 +3367,6 @@
   <p:clrMapOvr>
     <a:masterClrMapping/>
   </p:clrMapOvr>
-  <p:timing>
-    <p:tnLst>
-      <p:par>
-        <p:cTn id="1" dur="indefinite" restart="never" nodeType="tmRoot"/>
-      </p:par>
-    </p:tnLst>
-  </p:timing>
 </p:sld>
 </file>
 
@@ -3443,7 +3405,7 @@
           <a:lstStyle/>
           <a:p>
             <a:r>
-              <a:rPr lang="en-GB" sz="5400" dirty="0" smtClean="0"/>
+              <a:rPr lang="en-GB" sz="5400" dirty="0"/>
               <a:t>Playtest Feedback</a:t>
             </a:r>
             <a:endParaRPr lang="en-US" sz="5400" dirty="0"/>
@@ -3529,7 +3491,7 @@
           <a:p>
             <a:pPr algn="l"/>
             <a:r>
-              <a:rPr lang="en-GB" b="0" dirty="0" smtClean="0">
+              <a:rPr lang="en-GB" b="0" dirty="0">
                 <a:solidFill>
                   <a:srgbClr val="FF0000"/>
                 </a:solidFill>
@@ -3541,7 +3503,7 @@
           <a:p>
             <a:pPr algn="l"/>
             <a:r>
-              <a:rPr lang="en-GB" b="0" dirty="0" smtClean="0">
+              <a:rPr lang="en-GB" b="0" dirty="0">
                 <a:solidFill>
                   <a:srgbClr val="FF0000"/>
                 </a:solidFill>
@@ -3553,7 +3515,7 @@
           <a:p>
             <a:pPr algn="l"/>
             <a:r>
-              <a:rPr lang="en-GB" b="0" dirty="0" smtClean="0">
+              <a:rPr lang="en-GB" b="0" dirty="0">
                 <a:solidFill>
                   <a:srgbClr val="FF0000"/>
                 </a:solidFill>
@@ -3565,7 +3527,7 @@
           <a:p>
             <a:pPr algn="l"/>
             <a:r>
-              <a:rPr lang="en-GB" b="0" dirty="0" smtClean="0">
+              <a:rPr lang="en-GB" b="0" dirty="0">
                 <a:solidFill>
                   <a:srgbClr val="FF0000"/>
                 </a:solidFill>
@@ -3592,13 +3554,6 @@
   <p:clrMapOvr>
     <a:masterClrMapping/>
   </p:clrMapOvr>
-  <p:timing>
-    <p:tnLst>
-      <p:par>
-        <p:cTn id="1" dur="indefinite" restart="never" nodeType="tmRoot"/>
-      </p:par>
-    </p:tnLst>
-  </p:timing>
 </p:sld>
 </file>
 
@@ -3641,7 +3596,7 @@
           <a:p>
             <a:pPr algn="ctr"/>
             <a:r>
-              <a:rPr lang="en-GB" sz="5400" dirty="0" smtClean="0"/>
+              <a:rPr lang="en-GB" sz="5400" dirty="0"/>
               <a:t>Management</a:t>
             </a:r>
             <a:endParaRPr lang="en-US" sz="5400" dirty="0"/>
@@ -3668,73 +3623,31 @@
           <a:bodyPr/>
           <a:lstStyle/>
           <a:p>
-            <a:endParaRPr lang="en-GB" dirty="0" smtClean="0">
-              <a:latin typeface="+mj-lt"/>
-            </a:endParaRPr>
-          </a:p>
-          <a:p>
-            <a:r>
-              <a:rPr lang="en-GB" dirty="0" smtClean="0">
-                <a:latin typeface="+mj-lt"/>
-              </a:rPr>
-              <a:t>Emails:</a:t>
-            </a:r>
-          </a:p>
-          <a:p>
-            <a:endParaRPr lang="en-GB" dirty="0" smtClean="0">
-              <a:latin typeface="+mj-lt"/>
-            </a:endParaRPr>
-          </a:p>
-          <a:p>
-            <a:r>
-              <a:rPr lang="en-GB" dirty="0" smtClean="0">
-                <a:latin typeface="+mj-lt"/>
-              </a:rPr>
-              <a:t>George: 31</a:t>
-            </a:r>
-          </a:p>
-          <a:p>
-            <a:r>
-              <a:rPr lang="en-GB" dirty="0" smtClean="0">
-                <a:latin typeface="+mj-lt"/>
-              </a:rPr>
-              <a:t>Heidi: 34</a:t>
-            </a:r>
-          </a:p>
-          <a:p>
-            <a:r>
-              <a:rPr lang="en-GB" dirty="0" smtClean="0">
-                <a:latin typeface="+mj-lt"/>
-              </a:rPr>
-              <a:t>Macaulay: 5</a:t>
-            </a:r>
-          </a:p>
-          <a:p>
             <a:endParaRPr lang="en-GB" dirty="0">
               <a:latin typeface="+mj-lt"/>
             </a:endParaRPr>
           </a:p>
           <a:p>
-            <a:endParaRPr lang="en-GB" dirty="0" smtClean="0">
+            <a:endParaRPr lang="en-GB" dirty="0">
               <a:latin typeface="+mj-lt"/>
             </a:endParaRPr>
           </a:p>
           <a:p>
             <a:r>
-              <a:rPr lang="en-GB" dirty="0" smtClean="0">
+              <a:rPr lang="en-GB" sz="2400" dirty="0">
                 <a:latin typeface="+mj-lt"/>
               </a:rPr>
               <a:t>Hours logged:</a:t>
             </a:r>
           </a:p>
           <a:p>
-            <a:endParaRPr lang="en-GB" dirty="0" smtClean="0">
+            <a:endParaRPr lang="en-GB" sz="2400" dirty="0">
               <a:latin typeface="+mj-lt"/>
             </a:endParaRPr>
           </a:p>
           <a:p>
             <a:r>
-              <a:rPr lang="en-GB" dirty="0" smtClean="0">
+              <a:rPr lang="en-GB" sz="2400" dirty="0">
                 <a:latin typeface="+mj-lt"/>
               </a:rPr>
               <a:t>George: </a:t>
@@ -3742,7 +3655,7 @@
           </a:p>
           <a:p>
             <a:r>
-              <a:rPr lang="en-GB" dirty="0" smtClean="0">
+              <a:rPr lang="en-GB" sz="2400" dirty="0">
                 <a:latin typeface="+mj-lt"/>
               </a:rPr>
               <a:t>Heidi:</a:t>
@@ -3750,12 +3663,12 @@
           </a:p>
           <a:p>
             <a:r>
-              <a:rPr lang="en-GB" dirty="0" smtClean="0">
+              <a:rPr lang="en-GB" sz="2400" dirty="0">
                 <a:latin typeface="+mj-lt"/>
               </a:rPr>
               <a:t>Macaulay:</a:t>
             </a:r>
-            <a:endParaRPr lang="en-US" dirty="0">
+            <a:endParaRPr lang="en-US" sz="2400" dirty="0">
               <a:latin typeface="+mj-lt"/>
             </a:endParaRPr>
           </a:p>
@@ -3807,7 +3720,7 @@
           <a:lstStyle/>
           <a:p>
             <a:r>
-              <a:rPr lang="en-GB" sz="5400" dirty="0" smtClean="0"/>
+              <a:rPr lang="en-GB" sz="5400" dirty="0"/>
               <a:t>Next </a:t>
             </a:r>
             <a:endParaRPr lang="en-GB" dirty="0"/>
@@ -3842,7 +3755,7 @@
               </a:lnSpc>
             </a:pPr>
             <a:r>
-              <a:rPr lang="en-GB" dirty="0" smtClean="0">
+              <a:rPr lang="en-GB" dirty="0">
                 <a:latin typeface="+mj-lt"/>
               </a:rPr>
               <a:t>Finalising mechanics</a:t>
@@ -3855,7 +3768,7 @@
               </a:lnSpc>
             </a:pPr>
             <a:r>
-              <a:rPr lang="en-GB" dirty="0" smtClean="0">
+              <a:rPr lang="en-GB" dirty="0">
                 <a:latin typeface="+mj-lt"/>
               </a:rPr>
               <a:t>Playtesting to balance</a:t>
@@ -3868,7 +3781,7 @@
               </a:lnSpc>
             </a:pPr>
             <a:r>
-              <a:rPr lang="en-GB" dirty="0" smtClean="0">
+              <a:rPr lang="en-GB" dirty="0">
                 <a:latin typeface="+mj-lt"/>
               </a:rPr>
               <a:t>Playtest to see if mechanics are evoking emotional responses</a:t>
@@ -3880,7 +3793,7 @@
                 <a:spcPct val="150000"/>
               </a:lnSpc>
             </a:pPr>
-            <a:endParaRPr lang="en-GB" dirty="0" smtClean="0">
+            <a:endParaRPr lang="en-GB" dirty="0">
               <a:latin typeface="+mj-lt"/>
             </a:endParaRPr>
           </a:p>
@@ -3891,14 +3804,11 @@
               </a:lnSpc>
             </a:pPr>
             <a:r>
-              <a:rPr lang="en-GB" dirty="0" smtClean="0">
+              <a:rPr lang="en-GB" dirty="0">
                 <a:latin typeface="+mj-lt"/>
               </a:rPr>
               <a:t>Sounds </a:t>
             </a:r>
-            <a:endParaRPr lang="en-GB" dirty="0">
-              <a:latin typeface="+mj-lt"/>
-            </a:endParaRPr>
           </a:p>
           <a:p>
             <a:pPr lvl="1">
@@ -3920,13 +3830,6 @@
   <p:clrMapOvr>
     <a:masterClrMapping/>
   </p:clrMapOvr>
-  <p:timing>
-    <p:tnLst>
-      <p:par>
-        <p:cTn id="1" dur="indefinite" restart="never" nodeType="tmRoot"/>
-      </p:par>
-    </p:tnLst>
-  </p:timing>
 </p:sld>
 </file>
 
@@ -3981,13 +3884,6 @@
   <p:clrMapOvr>
     <a:masterClrMapping/>
   </p:clrMapOvr>
-  <p:timing>
-    <p:tnLst>
-      <p:par>
-        <p:cTn id="1" dur="indefinite" restart="never" nodeType="tmRoot"/>
-      </p:par>
-    </p:tnLst>
-  </p:timing>
 </p:sld>
 </file>
 
@@ -4030,25 +3926,16 @@
           </a:bodyPr>
           <a:lstStyle/>
           <a:p>
-            <a:r>
-              <a:rPr lang="en-GB" sz="5400" dirty="0" smtClean="0"/>
-              <a:t/>
-            </a:r>
             <a:br>
-              <a:rPr lang="en-GB" sz="5400" dirty="0" smtClean="0"/>
+              <a:rPr lang="en-GB" sz="5400" dirty="0"/>
             </a:br>
-            <a:r>
-              <a:rPr lang="en-GB" sz="5400" dirty="0" smtClean="0"/>
-              <a:t/>
-            </a:r>
             <a:br>
-              <a:rPr lang="en-GB" sz="5400" dirty="0" smtClean="0"/>
+              <a:rPr lang="en-GB" sz="5400" dirty="0"/>
             </a:br>
             <a:r>
-              <a:rPr lang="en-GB" sz="6000" dirty="0" smtClean="0"/>
+              <a:rPr lang="en-GB" sz="6000" dirty="0"/>
               <a:t>Logline</a:t>
             </a:r>
-            <a:endParaRPr lang="en-GB" sz="6000" dirty="0"/>
           </a:p>
         </p:txBody>
       </p:sp>
@@ -4086,43 +3973,7 @@
               <a:rPr lang="en-GB" dirty="0">
                 <a:latin typeface="+mj-lt"/>
               </a:rPr>
-              <a:t>Players aim to </a:t>
-            </a:r>
-            <a:r>
-              <a:rPr lang="en-GB" dirty="0" smtClean="0">
-                <a:latin typeface="+mj-lt"/>
-              </a:rPr>
-              <a:t>eat </a:t>
-            </a:r>
-            <a:r>
-              <a:rPr lang="en-GB" dirty="0">
-                <a:latin typeface="+mj-lt"/>
-              </a:rPr>
-              <a:t>bubbles while avoiding </a:t>
-            </a:r>
-            <a:r>
-              <a:rPr lang="en-GB" dirty="0" smtClean="0">
-                <a:latin typeface="+mj-lt"/>
-              </a:rPr>
-              <a:t>obstacles </a:t>
-            </a:r>
-            <a:r>
-              <a:rPr lang="en-GB" dirty="0">
-                <a:latin typeface="+mj-lt"/>
-              </a:rPr>
-              <a:t>and the first </a:t>
-            </a:r>
-            <a:r>
-              <a:rPr lang="en-GB" dirty="0" smtClean="0">
-                <a:latin typeface="+mj-lt"/>
-              </a:rPr>
-              <a:t>one to </a:t>
-            </a:r>
-            <a:r>
-              <a:rPr lang="en-GB" dirty="0">
-                <a:latin typeface="+mj-lt"/>
-              </a:rPr>
-              <a:t>eat their opponent, wins.</a:t>
+              <a:t>Players aim to eat bubbles while avoiding obstacles and the first one to eat their opponent, wins.</a:t>
             </a:r>
           </a:p>
         </p:txBody>
@@ -4132,13 +3983,6 @@
   <p:clrMapOvr>
     <a:masterClrMapping/>
   </p:clrMapOvr>
-  <p:timing>
-    <p:tnLst>
-      <p:par>
-        <p:cTn id="1" dur="indefinite" restart="never" nodeType="tmRoot"/>
-      </p:par>
-    </p:tnLst>
-  </p:timing>
 </p:sld>
 </file>
 
@@ -4219,28 +4063,22 @@
           </a:p>
           <a:p>
             <a:r>
-              <a:rPr lang="en-GB" dirty="0" smtClean="0">
+              <a:rPr lang="en-GB" dirty="0">
                 <a:latin typeface="+mj-lt"/>
               </a:rPr>
               <a:t>Fast paced, simultaneous gameplay which allows for social fun, </a:t>
             </a:r>
-            <a:endParaRPr lang="en-GB" dirty="0">
-              <a:latin typeface="+mj-lt"/>
-            </a:endParaRPr>
           </a:p>
           <a:p>
             <a:pPr marL="585216" lvl="1" indent="0">
               <a:buNone/>
             </a:pPr>
             <a:r>
-              <a:rPr lang="en-GB" dirty="0" smtClean="0">
+              <a:rPr lang="en-GB" dirty="0">
                 <a:latin typeface="+mj-lt"/>
               </a:rPr>
               <a:t>  </a:t>
             </a:r>
-            <a:endParaRPr lang="en-GB" dirty="0">
-              <a:latin typeface="+mj-lt"/>
-            </a:endParaRPr>
           </a:p>
           <a:p>
             <a:pPr lvl="1"/>
@@ -4306,13 +4144,6 @@
   <p:clrMapOvr>
     <a:masterClrMapping/>
   </p:clrMapOvr>
-  <p:timing>
-    <p:tnLst>
-      <p:par>
-        <p:cTn id="1" dur="indefinite" restart="never" nodeType="tmRoot"/>
-      </p:par>
-    </p:tnLst>
-  </p:timing>
 </p:sld>
 </file>
 
@@ -4351,10 +4182,9 @@
           <a:lstStyle/>
           <a:p>
             <a:r>
-              <a:rPr lang="en-GB" sz="5400" dirty="0" smtClean="0"/>
+              <a:rPr lang="en-GB" sz="5400" dirty="0"/>
               <a:t>Mechanics and Assets</a:t>
             </a:r>
-            <a:endParaRPr lang="en-GB" sz="5400" dirty="0"/>
           </a:p>
         </p:txBody>
       </p:sp>
@@ -4383,7 +4213,7 @@
             <a:pPr marL="265176" indent="0">
               <a:buNone/>
             </a:pPr>
-            <a:endParaRPr lang="en-GB" sz="11100" dirty="0" smtClean="0">
+            <a:endParaRPr lang="en-GB" sz="11100" dirty="0">
               <a:latin typeface="+mj-lt"/>
             </a:endParaRPr>
           </a:p>
@@ -4392,18 +4222,15 @@
               <a:buNone/>
             </a:pPr>
             <a:r>
-              <a:rPr lang="en-GB" sz="11100" dirty="0" smtClean="0">
+              <a:rPr lang="en-GB" sz="11100" dirty="0">
                 <a:latin typeface="+mj-lt"/>
               </a:rPr>
               <a:t>Game Play</a:t>
             </a:r>
-            <a:endParaRPr lang="en-GB" sz="11100" dirty="0">
-              <a:latin typeface="+mj-lt"/>
-            </a:endParaRPr>
-          </a:p>
-          <a:p>
-            <a:r>
-              <a:rPr lang="en-GB" sz="9800" dirty="0" smtClean="0">
+          </a:p>
+          <a:p>
+            <a:r>
+              <a:rPr lang="en-GB" sz="9800" dirty="0">
                 <a:latin typeface="+mj-lt"/>
               </a:rPr>
               <a:t>Scoring</a:t>
@@ -4411,18 +4238,15 @@
           </a:p>
           <a:p>
             <a:r>
-              <a:rPr lang="en-GB" sz="9800" dirty="0" smtClean="0">
+              <a:rPr lang="en-GB" sz="9800" dirty="0">
                 <a:latin typeface="+mj-lt"/>
               </a:rPr>
               <a:t>Eating/Absorbing</a:t>
             </a:r>
-            <a:endParaRPr lang="en-GB" sz="9800" dirty="0">
-              <a:latin typeface="+mj-lt"/>
-            </a:endParaRPr>
-          </a:p>
-          <a:p>
-            <a:r>
-              <a:rPr lang="en-GB" sz="9800" dirty="0" smtClean="0">
+          </a:p>
+          <a:p>
+            <a:r>
+              <a:rPr lang="en-GB" sz="9800" dirty="0">
                 <a:latin typeface="+mj-lt"/>
               </a:rPr>
               <a:t>Strategizing </a:t>
@@ -4448,7 +4272,7 @@
             <a:pPr marL="265176" indent="0">
               <a:buNone/>
             </a:pPr>
-            <a:endParaRPr lang="en-GB" sz="11100" dirty="0" smtClean="0">
+            <a:endParaRPr lang="en-GB" sz="11100" dirty="0">
               <a:latin typeface="+mj-lt"/>
             </a:endParaRPr>
           </a:p>
@@ -4465,19 +4289,16 @@
               <a:buNone/>
             </a:pPr>
             <a:r>
-              <a:rPr lang="en-GB" sz="10200" dirty="0" smtClean="0">
+              <a:rPr lang="en-GB" sz="10200" dirty="0">
                 <a:latin typeface="+mj-lt"/>
               </a:rPr>
               <a:t>	Obstacles</a:t>
             </a:r>
-            <a:endParaRPr lang="en-GB" sz="10200" dirty="0">
-              <a:latin typeface="+mj-lt"/>
-            </a:endParaRPr>
           </a:p>
           <a:p>
             <a:pPr lvl="1"/>
             <a:r>
-              <a:rPr lang="en-GB" sz="9800" dirty="0" smtClean="0">
+              <a:rPr lang="en-GB" sz="9800" dirty="0">
                 <a:latin typeface="+mj-lt"/>
               </a:rPr>
               <a:t>Branches</a:t>
@@ -4486,20 +4307,17 @@
           <a:p>
             <a:pPr lvl="1"/>
             <a:r>
-              <a:rPr lang="en-GB" sz="9800" dirty="0" smtClean="0">
+              <a:rPr lang="en-GB" sz="9800" dirty="0">
                 <a:latin typeface="+mj-lt"/>
               </a:rPr>
               <a:t>Fish/ Urchins</a:t>
             </a:r>
-            <a:endParaRPr lang="en-GB" sz="9800" dirty="0">
-              <a:latin typeface="+mj-lt"/>
-            </a:endParaRPr>
           </a:p>
           <a:p>
             <a:pPr marL="585216" lvl="1" indent="0">
               <a:buNone/>
             </a:pPr>
-            <a:endParaRPr lang="en-GB" sz="8000" dirty="0" smtClean="0">
+            <a:endParaRPr lang="en-GB" sz="8000" dirty="0">
               <a:latin typeface="+mj-lt"/>
             </a:endParaRPr>
           </a:p>
@@ -4801,13 +4619,6 @@
   <p:clrMapOvr>
     <a:masterClrMapping/>
   </p:clrMapOvr>
-  <p:timing>
-    <p:tnLst>
-      <p:par>
-        <p:cTn id="1" dur="indefinite" restart="never" nodeType="tmRoot"/>
-      </p:par>
-    </p:tnLst>
-  </p:timing>
 </p:sld>
 </file>
 
@@ -4846,7 +4657,7 @@
           <a:lstStyle/>
           <a:p>
             <a:r>
-              <a:rPr lang="en-GB" sz="5400" dirty="0" smtClean="0"/>
+              <a:rPr lang="en-GB" sz="5400" dirty="0"/>
               <a:t>Research</a:t>
             </a:r>
             <a:endParaRPr lang="en-US" sz="5400" dirty="0"/>
@@ -4884,13 +4695,7 @@
               <a:rPr lang="en-GB" sz="2800" dirty="0">
                 <a:latin typeface="+mj-lt"/>
               </a:rPr>
-              <a:t>We have researched games and took inspiration from</a:t>
-            </a:r>
-            <a:r>
-              <a:rPr lang="en-GB" sz="2800" dirty="0" smtClean="0">
-                <a:latin typeface="+mj-lt"/>
-              </a:rPr>
-              <a:t>:</a:t>
+              <a:t>We have researched games and took inspiration from:</a:t>
             </a:r>
           </a:p>
           <a:p>
@@ -4915,13 +4720,7 @@
               <a:rPr lang="en-GB" sz="2800" dirty="0">
                 <a:latin typeface="+mj-lt"/>
               </a:rPr>
-              <a:t>http://www.ologame.com</a:t>
-            </a:r>
-            <a:r>
-              <a:rPr lang="en-GB" sz="2800" dirty="0" smtClean="0">
-                <a:latin typeface="+mj-lt"/>
-              </a:rPr>
-              <a:t>/ </a:t>
+              <a:t>http://www.ologame.com/ </a:t>
             </a:r>
           </a:p>
           <a:p>
@@ -4946,13 +4745,7 @@
               <a:rPr lang="en-GB" sz="2800" dirty="0">
                 <a:latin typeface="+mj-lt"/>
               </a:rPr>
-              <a:t>http://</a:t>
-            </a:r>
-            <a:r>
-              <a:rPr lang="en-GB" sz="2800" dirty="0" smtClean="0">
-                <a:latin typeface="+mj-lt"/>
-              </a:rPr>
-              <a:t>www.newgrounds.com/</a:t>
+              <a:t>http://www.newgrounds.com/</a:t>
             </a:r>
           </a:p>
           <a:p>
@@ -4992,13 +4785,6 @@
   <p:clrMapOvr>
     <a:masterClrMapping/>
   </p:clrMapOvr>
-  <p:timing>
-    <p:tnLst>
-      <p:par>
-        <p:cTn id="1" dur="indefinite" restart="never" nodeType="tmRoot"/>
-      </p:par>
-    </p:tnLst>
-  </p:timing>
 </p:sld>
 </file>
 
@@ -5061,23 +4847,20 @@
           <a:lstStyle/>
           <a:p>
             <a:r>
-              <a:rPr lang="en-GB" sz="3200" dirty="0" smtClean="0">
+              <a:rPr lang="en-GB" sz="3200" dirty="0">
                 <a:latin typeface="+mj-lt"/>
               </a:rPr>
               <a:t>Buoyancy</a:t>
             </a:r>
+          </a:p>
+          <a:p>
             <a:endParaRPr lang="en-GB" sz="3200" dirty="0">
               <a:latin typeface="+mj-lt"/>
             </a:endParaRPr>
           </a:p>
           <a:p>
-            <a:endParaRPr lang="en-GB" sz="3200" dirty="0" smtClean="0">
-              <a:latin typeface="+mj-lt"/>
-            </a:endParaRPr>
-          </a:p>
-          <a:p>
-            <a:r>
-              <a:rPr lang="en-GB" sz="3200" b="1" dirty="0" smtClean="0">
+            <a:r>
+              <a:rPr lang="en-GB" sz="3200" b="1" dirty="0">
                 <a:latin typeface="+mj-lt"/>
               </a:rPr>
               <a:t>Iterations</a:t>
@@ -5086,7 +4869,7 @@
           <a:p>
             <a:pPr lvl="1"/>
             <a:r>
-              <a:rPr lang="en-GB" b="1" dirty="0" smtClean="0">
+              <a:rPr lang="en-GB" b="1" dirty="0">
                 <a:latin typeface="+mj-lt"/>
               </a:rPr>
               <a:t>Was a game of skill</a:t>
@@ -5095,7 +4878,7 @@
           <a:p>
             <a:pPr lvl="1"/>
             <a:r>
-              <a:rPr lang="en-GB" b="1" dirty="0" smtClean="0">
+              <a:rPr lang="en-GB" b="1" dirty="0">
                 <a:latin typeface="+mj-lt"/>
               </a:rPr>
               <a:t>Spawning of obstacles</a:t>
@@ -5104,7 +4887,7 @@
           <a:p>
             <a:pPr lvl="1"/>
             <a:r>
-              <a:rPr lang="en-GB" b="1" dirty="0" smtClean="0">
+              <a:rPr lang="en-GB" b="1" dirty="0">
                 <a:latin typeface="+mj-lt"/>
               </a:rPr>
               <a:t>Grabbing mechanic, adds unpredictability</a:t>
@@ -5113,7 +4896,7 @@
           <a:p>
             <a:pPr lvl="1"/>
             <a:r>
-              <a:rPr lang="en-GB" b="1" dirty="0" smtClean="0">
+              <a:rPr lang="en-GB" b="1" dirty="0">
                 <a:latin typeface="+mj-lt"/>
               </a:rPr>
               <a:t>Thruster, can be improved on movement, so its not as predictable</a:t>
@@ -5126,13 +4909,6 @@
   <p:clrMapOvr>
     <a:masterClrMapping/>
   </p:clrMapOvr>
-  <p:timing>
-    <p:tnLst>
-      <p:par>
-        <p:cTn id="1" dur="indefinite" restart="never" nodeType="tmRoot"/>
-      </p:par>
-    </p:tnLst>
-  </p:timing>
 </p:sld>
 </file>
 
@@ -5200,20 +4976,17 @@
             <a:pPr marL="137160" indent="0">
               <a:buNone/>
             </a:pPr>
-            <a:endParaRPr lang="en-GB" dirty="0" smtClean="0">
+            <a:endParaRPr lang="en-GB" dirty="0">
               <a:latin typeface="+mj-lt"/>
             </a:endParaRPr>
           </a:p>
           <a:p>
             <a:r>
-              <a:rPr lang="en-GB" dirty="0" smtClean="0">
+              <a:rPr lang="en-GB" dirty="0">
                 <a:latin typeface="+mj-lt"/>
               </a:rPr>
               <a:t>Competitiveness: Giving the winner bragging rights</a:t>
             </a:r>
-            <a:endParaRPr lang="en-GB" dirty="0">
-              <a:latin typeface="+mj-lt"/>
-            </a:endParaRPr>
           </a:p>
           <a:p>
             <a:pPr marL="137160" lvl="0" indent="0">
@@ -5226,14 +4999,11 @@
           <a:p>
             <a:pPr lvl="0"/>
             <a:r>
-              <a:rPr lang="en-GB" dirty="0" smtClean="0">
+              <a:rPr lang="en-GB" dirty="0">
                 <a:latin typeface="+mj-lt"/>
               </a:rPr>
               <a:t>Struggle: Race to gain higher score, to avoid obstacle.</a:t>
             </a:r>
-            <a:endParaRPr lang="en-GB" dirty="0">
-              <a:latin typeface="+mj-lt"/>
-            </a:endParaRPr>
           </a:p>
           <a:p>
             <a:pPr lvl="0"/>
@@ -5244,14 +5014,11 @@
           <a:p>
             <a:pPr lvl="0"/>
             <a:r>
-              <a:rPr lang="en-GB" dirty="0" smtClean="0">
+              <a:rPr lang="en-GB" dirty="0">
                 <a:latin typeface="+mj-lt"/>
               </a:rPr>
               <a:t>Strategy: Plan to position obstacles to hinder opponent. </a:t>
             </a:r>
-            <a:endParaRPr lang="en-GB" dirty="0">
-              <a:latin typeface="+mj-lt"/>
-            </a:endParaRPr>
           </a:p>
           <a:p>
             <a:pPr lvl="0"/>
@@ -5262,14 +5029,11 @@
           <a:p>
             <a:pPr lvl="0"/>
             <a:r>
-              <a:rPr lang="en-GB" dirty="0" smtClean="0">
+              <a:rPr lang="en-GB" dirty="0">
                 <a:latin typeface="+mj-lt"/>
               </a:rPr>
               <a:t>Aggressiveness: Game requires players to concentrate on attacking as well as defending their environment.</a:t>
             </a:r>
-            <a:endParaRPr lang="en-GB" dirty="0">
-              <a:latin typeface="+mj-lt"/>
-            </a:endParaRPr>
           </a:p>
           <a:p>
             <a:endParaRPr lang="en-GB" dirty="0"/>
@@ -5281,13 +5045,6 @@
   <p:clrMapOvr>
     <a:masterClrMapping/>
   </p:clrMapOvr>
-  <p:timing>
-    <p:tnLst>
-      <p:par>
-        <p:cTn id="1" dur="indefinite" restart="never" nodeType="tmRoot"/>
-      </p:par>
-    </p:tnLst>
-  </p:timing>
 </p:sld>
 </file>
 
@@ -5361,16 +5118,10 @@
           </a:p>
           <a:p>
             <a:r>
-              <a:rPr lang="en-GB" dirty="0" smtClean="0">
-                <a:latin typeface="+mj-lt"/>
-              </a:rPr>
-              <a:t>Unlimited </a:t>
-            </a:r>
-            <a:r>
               <a:rPr lang="en-GB" dirty="0">
                 <a:latin typeface="+mj-lt"/>
               </a:rPr>
-              <a:t>supply of items</a:t>
+              <a:t>Unlimited supply of items</a:t>
             </a:r>
           </a:p>
           <a:p>
@@ -5379,19 +5130,7 @@
               <a:rPr lang="en-GB" sz="2800" dirty="0">
                 <a:latin typeface="+mj-lt"/>
               </a:rPr>
-              <a:t>Race to </a:t>
-            </a:r>
-            <a:r>
-              <a:rPr lang="en-GB" sz="2800" dirty="0" smtClean="0">
-                <a:latin typeface="+mj-lt"/>
-              </a:rPr>
-              <a:t>use the </a:t>
-            </a:r>
-            <a:r>
-              <a:rPr lang="en-GB" sz="2800" dirty="0">
-                <a:latin typeface="+mj-lt"/>
-              </a:rPr>
-              <a:t>item</a:t>
+              <a:t>Race to use the item</a:t>
             </a:r>
           </a:p>
           <a:p>
@@ -5414,17 +5153,8 @@
               <a:rPr lang="en-GB" sz="2800" dirty="0">
                 <a:latin typeface="+mj-lt"/>
               </a:rPr>
-              <a:t>Players can bump </a:t>
-            </a:r>
-            <a:r>
-              <a:rPr lang="en-GB" sz="2800" dirty="0" smtClean="0">
-                <a:latin typeface="+mj-lt"/>
-              </a:rPr>
-              <a:t>the obstacles</a:t>
-            </a:r>
-            <a:endParaRPr lang="en-GB" sz="2800" dirty="0">
-              <a:latin typeface="+mj-lt"/>
-            </a:endParaRPr>
+              <a:t>Players can bump the obstacles</a:t>
+            </a:r>
           </a:p>
           <a:p>
             <a:pPr lvl="1"/>
@@ -5441,13 +5171,6 @@
   <p:clrMapOvr>
     <a:masterClrMapping/>
   </p:clrMapOvr>
-  <p:timing>
-    <p:tnLst>
-      <p:par>
-        <p:cTn id="1" dur="indefinite" restart="never" nodeType="tmRoot"/>
-      </p:par>
-    </p:tnLst>
-  </p:timing>
 </p:sld>
 </file>
 
@@ -5539,18 +5262,161 @@
           </a:p>
         </p:txBody>
       </p:sp>
+      <p:pic>
+        <p:nvPicPr>
+          <p:cNvPr id="3" name="Picture 2"/>
+          <p:cNvPicPr>
+            <a:picLocks noChangeAspect="1"/>
+          </p:cNvPicPr>
+          <p:nvPr/>
+        </p:nvPicPr>
+        <p:blipFill>
+          <a:blip r:embed="rId2" cstate="print">
+            <a:extLst>
+              <a:ext uri="{28A0092B-C50C-407E-A947-70E740481C1C}">
+                <a14:useLocalDpi xmlns:a14="http://schemas.microsoft.com/office/drawing/2010/main" val="0"/>
+              </a:ext>
+            </a:extLst>
+          </a:blip>
+          <a:stretch>
+            <a:fillRect/>
+          </a:stretch>
+        </p:blipFill>
+        <p:spPr>
+          <a:xfrm>
+            <a:off x="4439203" y="2468974"/>
+            <a:ext cx="4937348" cy="4937348"/>
+          </a:xfrm>
+          <a:prstGeom prst="rect">
+            <a:avLst/>
+          </a:prstGeom>
+        </p:spPr>
+      </p:pic>
+      <p:pic>
+        <p:nvPicPr>
+          <p:cNvPr id="6" name="Picture 5"/>
+          <p:cNvPicPr>
+            <a:picLocks noChangeAspect="1"/>
+          </p:cNvPicPr>
+          <p:nvPr/>
+        </p:nvPicPr>
+        <p:blipFill>
+          <a:blip r:embed="rId3" cstate="print">
+            <a:extLst>
+              <a:ext uri="{28A0092B-C50C-407E-A947-70E740481C1C}">
+                <a14:useLocalDpi xmlns:a14="http://schemas.microsoft.com/office/drawing/2010/main" val="0"/>
+              </a:ext>
+            </a:extLst>
+          </a:blip>
+          <a:stretch>
+            <a:fillRect/>
+          </a:stretch>
+        </p:blipFill>
+        <p:spPr>
+          <a:xfrm>
+            <a:off x="6470479" y="846138"/>
+            <a:ext cx="2737447" cy="2736344"/>
+          </a:xfrm>
+          <a:prstGeom prst="rect">
+            <a:avLst/>
+          </a:prstGeom>
+        </p:spPr>
+      </p:pic>
+      <p:pic>
+        <p:nvPicPr>
+          <p:cNvPr id="7" name="Picture 6"/>
+          <p:cNvPicPr>
+            <a:picLocks noChangeAspect="1"/>
+          </p:cNvPicPr>
+          <p:nvPr/>
+        </p:nvPicPr>
+        <p:blipFill>
+          <a:blip r:embed="rId4" cstate="print">
+            <a:extLst>
+              <a:ext uri="{28A0092B-C50C-407E-A947-70E740481C1C}">
+                <a14:useLocalDpi xmlns:a14="http://schemas.microsoft.com/office/drawing/2010/main" val="0"/>
+              </a:ext>
+            </a:extLst>
+          </a:blip>
+          <a:stretch>
+            <a:fillRect/>
+          </a:stretch>
+        </p:blipFill>
+        <p:spPr>
+          <a:xfrm>
+            <a:off x="2520" y="2438607"/>
+            <a:ext cx="3573016" cy="3573016"/>
+          </a:xfrm>
+          <a:prstGeom prst="rect">
+            <a:avLst/>
+          </a:prstGeom>
+        </p:spPr>
+      </p:pic>
+      <p:pic>
+        <p:nvPicPr>
+          <p:cNvPr id="8" name="Picture 7"/>
+          <p:cNvPicPr>
+            <a:picLocks noChangeAspect="1"/>
+          </p:cNvPicPr>
+          <p:nvPr/>
+        </p:nvPicPr>
+        <p:blipFill>
+          <a:blip r:embed="rId5" cstate="print">
+            <a:extLst>
+              <a:ext uri="{28A0092B-C50C-407E-A947-70E740481C1C}">
+                <a14:useLocalDpi xmlns:a14="http://schemas.microsoft.com/office/drawing/2010/main" val="0"/>
+              </a:ext>
+            </a:extLst>
+          </a:blip>
+          <a:stretch>
+            <a:fillRect/>
+          </a:stretch>
+        </p:blipFill>
+        <p:spPr>
+          <a:xfrm>
+            <a:off x="3460545" y="1772796"/>
+            <a:ext cx="2664296" cy="2664296"/>
+          </a:xfrm>
+          <a:prstGeom prst="rect">
+            <a:avLst/>
+          </a:prstGeom>
+        </p:spPr>
+      </p:pic>
+      <p:pic>
+        <p:nvPicPr>
+          <p:cNvPr id="4" name="Picture 3"/>
+          <p:cNvPicPr>
+            <a:picLocks noChangeAspect="1"/>
+          </p:cNvPicPr>
+          <p:nvPr/>
+        </p:nvPicPr>
+        <p:blipFill>
+          <a:blip r:embed="rId6" cstate="print">
+            <a:extLst>
+              <a:ext uri="{28A0092B-C50C-407E-A947-70E740481C1C}">
+                <a14:useLocalDpi xmlns:a14="http://schemas.microsoft.com/office/drawing/2010/main" val="0"/>
+              </a:ext>
+            </a:extLst>
+          </a:blip>
+          <a:stretch>
+            <a:fillRect/>
+          </a:stretch>
+        </p:blipFill>
+        <p:spPr>
+          <a:xfrm>
+            <a:off x="2219477" y="4239303"/>
+            <a:ext cx="2926123" cy="2924944"/>
+          </a:xfrm>
+          <a:prstGeom prst="rect">
+            <a:avLst/>
+          </a:prstGeom>
+        </p:spPr>
+      </p:pic>
     </p:spTree>
   </p:cSld>
   <p:clrMapOvr>
     <a:masterClrMapping/>
   </p:clrMapOvr>
-  <p:timing>
-    <p:tnLst>
-      <p:par>
-        <p:cTn id="1" dur="indefinite" restart="never" nodeType="tmRoot"/>
-      </p:par>
-    </p:tnLst>
-  </p:timing>
 </p:sld>
 </file>
 

</xml_diff>